<commit_message>
Minor change to the workshop intro
</commit_message>
<xml_diff>
--- a/lessons/workshop_introduction.pptx
+++ b/lessons/workshop_introduction.pptx
@@ -266,7 +266,7 @@
           <a:p>
             <a:fld id="{B4D147CC-DF06-4568-84A5-1913B79BC2C0}" type="datetimeFigureOut">
               <a:rPr lang="en-US" smtClean="0"/>
-              <a:t>7/26/2021</a:t>
+              <a:t>8/5/2021</a:t>
             </a:fld>
             <a:endParaRPr lang="en-US"/>
           </a:p>
@@ -464,7 +464,7 @@
           <a:p>
             <a:fld id="{B4D147CC-DF06-4568-84A5-1913B79BC2C0}" type="datetimeFigureOut">
               <a:rPr lang="en-US" smtClean="0"/>
-              <a:t>7/26/2021</a:t>
+              <a:t>8/5/2021</a:t>
             </a:fld>
             <a:endParaRPr lang="en-US"/>
           </a:p>
@@ -672,7 +672,7 @@
           <a:p>
             <a:fld id="{B4D147CC-DF06-4568-84A5-1913B79BC2C0}" type="datetimeFigureOut">
               <a:rPr lang="en-US" smtClean="0"/>
-              <a:t>7/26/2021</a:t>
+              <a:t>8/5/2021</a:t>
             </a:fld>
             <a:endParaRPr lang="en-US"/>
           </a:p>
@@ -870,7 +870,7 @@
           <a:p>
             <a:fld id="{B4D147CC-DF06-4568-84A5-1913B79BC2C0}" type="datetimeFigureOut">
               <a:rPr lang="en-US" smtClean="0"/>
-              <a:t>7/26/2021</a:t>
+              <a:t>8/5/2021</a:t>
             </a:fld>
             <a:endParaRPr lang="en-US"/>
           </a:p>
@@ -1145,7 +1145,7 @@
           <a:p>
             <a:fld id="{B4D147CC-DF06-4568-84A5-1913B79BC2C0}" type="datetimeFigureOut">
               <a:rPr lang="en-US" smtClean="0"/>
-              <a:t>7/26/2021</a:t>
+              <a:t>8/5/2021</a:t>
             </a:fld>
             <a:endParaRPr lang="en-US"/>
           </a:p>
@@ -1410,7 +1410,7 @@
           <a:p>
             <a:fld id="{B4D147CC-DF06-4568-84A5-1913B79BC2C0}" type="datetimeFigureOut">
               <a:rPr lang="en-US" smtClean="0"/>
-              <a:t>7/26/2021</a:t>
+              <a:t>8/5/2021</a:t>
             </a:fld>
             <a:endParaRPr lang="en-US"/>
           </a:p>
@@ -1822,7 +1822,7 @@
           <a:p>
             <a:fld id="{B4D147CC-DF06-4568-84A5-1913B79BC2C0}" type="datetimeFigureOut">
               <a:rPr lang="en-US" smtClean="0"/>
-              <a:t>7/26/2021</a:t>
+              <a:t>8/5/2021</a:t>
             </a:fld>
             <a:endParaRPr lang="en-US"/>
           </a:p>
@@ -1963,7 +1963,7 @@
           <a:p>
             <a:fld id="{B4D147CC-DF06-4568-84A5-1913B79BC2C0}" type="datetimeFigureOut">
               <a:rPr lang="en-US" smtClean="0"/>
-              <a:t>7/26/2021</a:t>
+              <a:t>8/5/2021</a:t>
             </a:fld>
             <a:endParaRPr lang="en-US"/>
           </a:p>
@@ -2076,7 +2076,7 @@
           <a:p>
             <a:fld id="{B4D147CC-DF06-4568-84A5-1913B79BC2C0}" type="datetimeFigureOut">
               <a:rPr lang="en-US" smtClean="0"/>
-              <a:t>7/26/2021</a:t>
+              <a:t>8/5/2021</a:t>
             </a:fld>
             <a:endParaRPr lang="en-US"/>
           </a:p>
@@ -2387,7 +2387,7 @@
           <a:p>
             <a:fld id="{B4D147CC-DF06-4568-84A5-1913B79BC2C0}" type="datetimeFigureOut">
               <a:rPr lang="en-US" smtClean="0"/>
-              <a:t>7/26/2021</a:t>
+              <a:t>8/5/2021</a:t>
             </a:fld>
             <a:endParaRPr lang="en-US"/>
           </a:p>
@@ -2675,7 +2675,7 @@
           <a:p>
             <a:fld id="{B4D147CC-DF06-4568-84A5-1913B79BC2C0}" type="datetimeFigureOut">
               <a:rPr lang="en-US" smtClean="0"/>
-              <a:t>7/26/2021</a:t>
+              <a:t>8/5/2021</a:t>
             </a:fld>
             <a:endParaRPr lang="en-US"/>
           </a:p>
@@ -2916,7 +2916,7 @@
           <a:p>
             <a:fld id="{B4D147CC-DF06-4568-84A5-1913B79BC2C0}" type="datetimeFigureOut">
               <a:rPr lang="en-US" smtClean="0"/>
-              <a:t>7/26/2021</a:t>
+              <a:t>8/5/2021</a:t>
             </a:fld>
             <a:endParaRPr lang="en-US"/>
           </a:p>
@@ -3451,7 +3451,7 @@
           <a:p>
             <a:r>
               <a:rPr lang="en-US" sz="1600" dirty="0"/>
-              <a:t>08/10/2020</a:t>
+              <a:t>08/5 – 8/6/2021</a:t>
             </a:r>
           </a:p>
         </p:txBody>
@@ -3663,6 +3663,13 @@
             <a:r>
               <a:rPr lang="en-US" dirty="0"/>
               <a:t>Occupancy modeling</a:t>
+            </a:r>
+          </a:p>
+          <a:p>
+            <a:pPr lvl="1"/>
+            <a:r>
+              <a:rPr lang="en-US" dirty="0"/>
+              <a:t>Discussion</a:t>
             </a:r>
           </a:p>
         </p:txBody>

</xml_diff>